<commit_message>
Random Button Added, AutoPlay Button Added
</commit_message>
<xml_diff>
--- a/Wallpaper/Music Player Icons Selfmade.pptx
+++ b/Wallpaper/Music Player Icons Selfmade.pptx
@@ -9,6 +9,7 @@
     <p:sldId id="257" r:id="rId3"/>
     <p:sldId id="258" r:id="rId4"/>
     <p:sldId id="259" r:id="rId5"/>
+    <p:sldId id="260" r:id="rId6"/>
   </p:sldIdLst>
   <p:sldSz cx="12192000" cy="6858000"/>
   <p:notesSz cx="6858000" cy="9144000"/>
@@ -262,7 +263,7 @@
           <a:p>
             <a:fld id="{BDE5C450-DFDD-4624-A864-54151049D9CC}" type="datetimeFigureOut">
               <a:rPr lang="de-DE" smtClean="0"/>
-              <a:t>04.07.2023</a:t>
+              <a:t>05.07.2023</a:t>
             </a:fld>
             <a:endParaRPr lang="de-DE"/>
           </a:p>
@@ -460,7 +461,7 @@
           <a:p>
             <a:fld id="{BDE5C450-DFDD-4624-A864-54151049D9CC}" type="datetimeFigureOut">
               <a:rPr lang="de-DE" smtClean="0"/>
-              <a:t>04.07.2023</a:t>
+              <a:t>05.07.2023</a:t>
             </a:fld>
             <a:endParaRPr lang="de-DE"/>
           </a:p>
@@ -668,7 +669,7 @@
           <a:p>
             <a:fld id="{BDE5C450-DFDD-4624-A864-54151049D9CC}" type="datetimeFigureOut">
               <a:rPr lang="de-DE" smtClean="0"/>
-              <a:t>04.07.2023</a:t>
+              <a:t>05.07.2023</a:t>
             </a:fld>
             <a:endParaRPr lang="de-DE"/>
           </a:p>
@@ -866,7 +867,7 @@
           <a:p>
             <a:fld id="{BDE5C450-DFDD-4624-A864-54151049D9CC}" type="datetimeFigureOut">
               <a:rPr lang="de-DE" smtClean="0"/>
-              <a:t>04.07.2023</a:t>
+              <a:t>05.07.2023</a:t>
             </a:fld>
             <a:endParaRPr lang="de-DE"/>
           </a:p>
@@ -1141,7 +1142,7 @@
           <a:p>
             <a:fld id="{BDE5C450-DFDD-4624-A864-54151049D9CC}" type="datetimeFigureOut">
               <a:rPr lang="de-DE" smtClean="0"/>
-              <a:t>04.07.2023</a:t>
+              <a:t>05.07.2023</a:t>
             </a:fld>
             <a:endParaRPr lang="de-DE"/>
           </a:p>
@@ -1406,7 +1407,7 @@
           <a:p>
             <a:fld id="{BDE5C450-DFDD-4624-A864-54151049D9CC}" type="datetimeFigureOut">
               <a:rPr lang="de-DE" smtClean="0"/>
-              <a:t>04.07.2023</a:t>
+              <a:t>05.07.2023</a:t>
             </a:fld>
             <a:endParaRPr lang="de-DE"/>
           </a:p>
@@ -1818,7 +1819,7 @@
           <a:p>
             <a:fld id="{BDE5C450-DFDD-4624-A864-54151049D9CC}" type="datetimeFigureOut">
               <a:rPr lang="de-DE" smtClean="0"/>
-              <a:t>04.07.2023</a:t>
+              <a:t>05.07.2023</a:t>
             </a:fld>
             <a:endParaRPr lang="de-DE"/>
           </a:p>
@@ -1959,7 +1960,7 @@
           <a:p>
             <a:fld id="{BDE5C450-DFDD-4624-A864-54151049D9CC}" type="datetimeFigureOut">
               <a:rPr lang="de-DE" smtClean="0"/>
-              <a:t>04.07.2023</a:t>
+              <a:t>05.07.2023</a:t>
             </a:fld>
             <a:endParaRPr lang="de-DE"/>
           </a:p>
@@ -2072,7 +2073,7 @@
           <a:p>
             <a:fld id="{BDE5C450-DFDD-4624-A864-54151049D9CC}" type="datetimeFigureOut">
               <a:rPr lang="de-DE" smtClean="0"/>
-              <a:t>04.07.2023</a:t>
+              <a:t>05.07.2023</a:t>
             </a:fld>
             <a:endParaRPr lang="de-DE"/>
           </a:p>
@@ -2383,7 +2384,7 @@
           <a:p>
             <a:fld id="{BDE5C450-DFDD-4624-A864-54151049D9CC}" type="datetimeFigureOut">
               <a:rPr lang="de-DE" smtClean="0"/>
-              <a:t>04.07.2023</a:t>
+              <a:t>05.07.2023</a:t>
             </a:fld>
             <a:endParaRPr lang="de-DE"/>
           </a:p>
@@ -2671,7 +2672,7 @@
           <a:p>
             <a:fld id="{BDE5C450-DFDD-4624-A864-54151049D9CC}" type="datetimeFigureOut">
               <a:rPr lang="de-DE" smtClean="0"/>
-              <a:t>04.07.2023</a:t>
+              <a:t>05.07.2023</a:t>
             </a:fld>
             <a:endParaRPr lang="de-DE"/>
           </a:p>
@@ -2912,7 +2913,7 @@
           <a:p>
             <a:fld id="{BDE5C450-DFDD-4624-A864-54151049D9CC}" type="datetimeFigureOut">
               <a:rPr lang="de-DE" smtClean="0"/>
-              <a:t>04.07.2023</a:t>
+              <a:t>05.07.2023</a:t>
             </a:fld>
             <a:endParaRPr lang="de-DE"/>
           </a:p>
@@ -4612,6 +4613,36 @@
 </p:sld>
 </file>
 
+<file path=ppt/slides/slide5.xml><?xml version="1.0" encoding="utf-8"?>
+<p:sld xmlns:a="http://schemas.openxmlformats.org/drawingml/2006/main" xmlns:r="http://schemas.openxmlformats.org/officeDocument/2006/relationships" xmlns:p="http://schemas.openxmlformats.org/presentationml/2006/main">
+  <p:cSld>
+    <p:spTree>
+      <p:nvGrpSpPr>
+        <p:cNvPr id="1" name=""/>
+        <p:cNvGrpSpPr/>
+        <p:nvPr/>
+      </p:nvGrpSpPr>
+      <p:grpSpPr>
+        <a:xfrm>
+          <a:off x="0" y="0"/>
+          <a:ext cx="0" cy="0"/>
+          <a:chOff x="0" y="0"/>
+          <a:chExt cx="0" cy="0"/>
+        </a:xfrm>
+      </p:grpSpPr>
+    </p:spTree>
+    <p:extLst>
+      <p:ext uri="{BB962C8B-B14F-4D97-AF65-F5344CB8AC3E}">
+        <p14:creationId xmlns:p14="http://schemas.microsoft.com/office/powerpoint/2010/main" val="3220580799"/>
+      </p:ext>
+    </p:extLst>
+  </p:cSld>
+  <p:clrMapOvr>
+    <a:masterClrMapping/>
+  </p:clrMapOvr>
+</p:sld>
+</file>
+
 <file path=ppt/theme/theme1.xml><?xml version="1.0" encoding="utf-8"?>
 <a:theme xmlns:a="http://schemas.openxmlformats.org/drawingml/2006/main" name="Office">
   <a:themeElements>

</xml_diff>

<commit_message>
Bugfixes. Fix of issue when last song is played and autoplay and randomsong was activated. Track pausend and because audioended the indexes where adding up ever millisecond. Also design fixes where made.
</commit_message>
<xml_diff>
--- a/Wallpaper/Music Player Icons Selfmade.pptx
+++ b/Wallpaper/Music Player Icons Selfmade.pptx
@@ -263,7 +263,7 @@
           <a:p>
             <a:fld id="{BDE5C450-DFDD-4624-A864-54151049D9CC}" type="datetimeFigureOut">
               <a:rPr lang="de-DE" smtClean="0"/>
-              <a:t>05.07.2023</a:t>
+              <a:t>21.07.2023</a:t>
             </a:fld>
             <a:endParaRPr lang="de-DE"/>
           </a:p>
@@ -461,7 +461,7 @@
           <a:p>
             <a:fld id="{BDE5C450-DFDD-4624-A864-54151049D9CC}" type="datetimeFigureOut">
               <a:rPr lang="de-DE" smtClean="0"/>
-              <a:t>05.07.2023</a:t>
+              <a:t>21.07.2023</a:t>
             </a:fld>
             <a:endParaRPr lang="de-DE"/>
           </a:p>
@@ -669,7 +669,7 @@
           <a:p>
             <a:fld id="{BDE5C450-DFDD-4624-A864-54151049D9CC}" type="datetimeFigureOut">
               <a:rPr lang="de-DE" smtClean="0"/>
-              <a:t>05.07.2023</a:t>
+              <a:t>21.07.2023</a:t>
             </a:fld>
             <a:endParaRPr lang="de-DE"/>
           </a:p>
@@ -867,7 +867,7 @@
           <a:p>
             <a:fld id="{BDE5C450-DFDD-4624-A864-54151049D9CC}" type="datetimeFigureOut">
               <a:rPr lang="de-DE" smtClean="0"/>
-              <a:t>05.07.2023</a:t>
+              <a:t>21.07.2023</a:t>
             </a:fld>
             <a:endParaRPr lang="de-DE"/>
           </a:p>
@@ -1142,7 +1142,7 @@
           <a:p>
             <a:fld id="{BDE5C450-DFDD-4624-A864-54151049D9CC}" type="datetimeFigureOut">
               <a:rPr lang="de-DE" smtClean="0"/>
-              <a:t>05.07.2023</a:t>
+              <a:t>21.07.2023</a:t>
             </a:fld>
             <a:endParaRPr lang="de-DE"/>
           </a:p>
@@ -1407,7 +1407,7 @@
           <a:p>
             <a:fld id="{BDE5C450-DFDD-4624-A864-54151049D9CC}" type="datetimeFigureOut">
               <a:rPr lang="de-DE" smtClean="0"/>
-              <a:t>05.07.2023</a:t>
+              <a:t>21.07.2023</a:t>
             </a:fld>
             <a:endParaRPr lang="de-DE"/>
           </a:p>
@@ -1819,7 +1819,7 @@
           <a:p>
             <a:fld id="{BDE5C450-DFDD-4624-A864-54151049D9CC}" type="datetimeFigureOut">
               <a:rPr lang="de-DE" smtClean="0"/>
-              <a:t>05.07.2023</a:t>
+              <a:t>21.07.2023</a:t>
             </a:fld>
             <a:endParaRPr lang="de-DE"/>
           </a:p>
@@ -1960,7 +1960,7 @@
           <a:p>
             <a:fld id="{BDE5C450-DFDD-4624-A864-54151049D9CC}" type="datetimeFigureOut">
               <a:rPr lang="de-DE" smtClean="0"/>
-              <a:t>05.07.2023</a:t>
+              <a:t>21.07.2023</a:t>
             </a:fld>
             <a:endParaRPr lang="de-DE"/>
           </a:p>
@@ -2073,7 +2073,7 @@
           <a:p>
             <a:fld id="{BDE5C450-DFDD-4624-A864-54151049D9CC}" type="datetimeFigureOut">
               <a:rPr lang="de-DE" smtClean="0"/>
-              <a:t>05.07.2023</a:t>
+              <a:t>21.07.2023</a:t>
             </a:fld>
             <a:endParaRPr lang="de-DE"/>
           </a:p>
@@ -2384,7 +2384,7 @@
           <a:p>
             <a:fld id="{BDE5C450-DFDD-4624-A864-54151049D9CC}" type="datetimeFigureOut">
               <a:rPr lang="de-DE" smtClean="0"/>
-              <a:t>05.07.2023</a:t>
+              <a:t>21.07.2023</a:t>
             </a:fld>
             <a:endParaRPr lang="de-DE"/>
           </a:p>
@@ -2672,7 +2672,7 @@
           <a:p>
             <a:fld id="{BDE5C450-DFDD-4624-A864-54151049D9CC}" type="datetimeFigureOut">
               <a:rPr lang="de-DE" smtClean="0"/>
-              <a:t>05.07.2023</a:t>
+              <a:t>21.07.2023</a:t>
             </a:fld>
             <a:endParaRPr lang="de-DE"/>
           </a:p>
@@ -2913,7 +2913,7 @@
           <a:p>
             <a:fld id="{BDE5C450-DFDD-4624-A864-54151049D9CC}" type="datetimeFigureOut">
               <a:rPr lang="de-DE" smtClean="0"/>
-              <a:t>05.07.2023</a:t>
+              <a:t>21.07.2023</a:t>
             </a:fld>
             <a:endParaRPr lang="de-DE"/>
           </a:p>
@@ -4630,6 +4630,939 @@
           <a:chExt cx="0" cy="0"/>
         </a:xfrm>
       </p:grpSpPr>
+      <p:cxnSp>
+        <p:nvCxnSpPr>
+          <p:cNvPr id="3" name="Gerader Verbinder 2">
+            <a:extLst>
+              <a:ext uri="{FF2B5EF4-FFF2-40B4-BE49-F238E27FC236}">
+                <a16:creationId xmlns:a16="http://schemas.microsoft.com/office/drawing/2014/main" id="{B0FD5AA7-F5DD-1A39-CD0E-88237EC93347}"/>
+              </a:ext>
+            </a:extLst>
+          </p:cNvPr>
+          <p:cNvCxnSpPr>
+            <a:cxnSpLocks/>
+          </p:cNvCxnSpPr>
+          <p:nvPr/>
+        </p:nvCxnSpPr>
+        <p:spPr>
+          <a:xfrm>
+            <a:off x="4215384" y="2412362"/>
+            <a:ext cx="1009102" cy="0"/>
+          </a:xfrm>
+          <a:prstGeom prst="line">
+            <a:avLst/>
+          </a:prstGeom>
+          <a:ln w="76200"/>
+        </p:spPr>
+        <p:style>
+          <a:lnRef idx="3">
+            <a:schemeClr val="dk1"/>
+          </a:lnRef>
+          <a:fillRef idx="0">
+            <a:schemeClr val="dk1"/>
+          </a:fillRef>
+          <a:effectRef idx="2">
+            <a:schemeClr val="dk1"/>
+          </a:effectRef>
+          <a:fontRef idx="minor">
+            <a:schemeClr val="tx1"/>
+          </a:fontRef>
+        </p:style>
+      </p:cxnSp>
+      <p:cxnSp>
+        <p:nvCxnSpPr>
+          <p:cNvPr id="5" name="Gerader Verbinder 4">
+            <a:extLst>
+              <a:ext uri="{FF2B5EF4-FFF2-40B4-BE49-F238E27FC236}">
+                <a16:creationId xmlns:a16="http://schemas.microsoft.com/office/drawing/2014/main" id="{99C3E845-8A04-7978-3E48-77BA73A0D7A2}"/>
+              </a:ext>
+            </a:extLst>
+          </p:cNvPr>
+          <p:cNvCxnSpPr>
+            <a:cxnSpLocks/>
+          </p:cNvCxnSpPr>
+          <p:nvPr/>
+        </p:nvCxnSpPr>
+        <p:spPr>
+          <a:xfrm>
+            <a:off x="4215384" y="3612416"/>
+            <a:ext cx="1009102" cy="0"/>
+          </a:xfrm>
+          <a:prstGeom prst="line">
+            <a:avLst/>
+          </a:prstGeom>
+          <a:ln w="76200"/>
+        </p:spPr>
+        <p:style>
+          <a:lnRef idx="3">
+            <a:schemeClr val="dk1"/>
+          </a:lnRef>
+          <a:fillRef idx="0">
+            <a:schemeClr val="dk1"/>
+          </a:fillRef>
+          <a:effectRef idx="2">
+            <a:schemeClr val="dk1"/>
+          </a:effectRef>
+          <a:fontRef idx="minor">
+            <a:schemeClr val="tx1"/>
+          </a:fontRef>
+        </p:style>
+      </p:cxnSp>
+      <p:cxnSp>
+        <p:nvCxnSpPr>
+          <p:cNvPr id="7" name="Gerader Verbinder 6">
+            <a:extLst>
+              <a:ext uri="{FF2B5EF4-FFF2-40B4-BE49-F238E27FC236}">
+                <a16:creationId xmlns:a16="http://schemas.microsoft.com/office/drawing/2014/main" id="{CADD3861-6302-149D-3AD0-98D5549E8DD6}"/>
+              </a:ext>
+            </a:extLst>
+          </p:cNvPr>
+          <p:cNvCxnSpPr>
+            <a:cxnSpLocks/>
+          </p:cNvCxnSpPr>
+          <p:nvPr/>
+        </p:nvCxnSpPr>
+        <p:spPr>
+          <a:xfrm rot="8100000">
+            <a:off x="4944434" y="3012253"/>
+            <a:ext cx="1728000" cy="0"/>
+          </a:xfrm>
+          <a:prstGeom prst="line">
+            <a:avLst/>
+          </a:prstGeom>
+          <a:ln w="76200"/>
+        </p:spPr>
+        <p:style>
+          <a:lnRef idx="3">
+            <a:schemeClr val="dk1"/>
+          </a:lnRef>
+          <a:fillRef idx="0">
+            <a:schemeClr val="dk1"/>
+          </a:fillRef>
+          <a:effectRef idx="2">
+            <a:schemeClr val="dk1"/>
+          </a:effectRef>
+          <a:fontRef idx="minor">
+            <a:schemeClr val="tx1"/>
+          </a:fontRef>
+        </p:style>
+      </p:cxnSp>
+      <p:cxnSp>
+        <p:nvCxnSpPr>
+          <p:cNvPr id="11" name="Gerader Verbinder 10">
+            <a:extLst>
+              <a:ext uri="{FF2B5EF4-FFF2-40B4-BE49-F238E27FC236}">
+                <a16:creationId xmlns:a16="http://schemas.microsoft.com/office/drawing/2014/main" id="{8DDA5911-3B10-7DE1-80C8-339F4B513E77}"/>
+              </a:ext>
+            </a:extLst>
+          </p:cNvPr>
+          <p:cNvCxnSpPr>
+            <a:cxnSpLocks/>
+          </p:cNvCxnSpPr>
+          <p:nvPr/>
+        </p:nvCxnSpPr>
+        <p:spPr>
+          <a:xfrm rot="2700000">
+            <a:off x="4944433" y="3012252"/>
+            <a:ext cx="1728000" cy="0"/>
+          </a:xfrm>
+          <a:prstGeom prst="line">
+            <a:avLst/>
+          </a:prstGeom>
+          <a:ln w="76200"/>
+        </p:spPr>
+        <p:style>
+          <a:lnRef idx="3">
+            <a:schemeClr val="dk1"/>
+          </a:lnRef>
+          <a:fillRef idx="0">
+            <a:schemeClr val="dk1"/>
+          </a:fillRef>
+          <a:effectRef idx="2">
+            <a:schemeClr val="dk1"/>
+          </a:effectRef>
+          <a:fontRef idx="minor">
+            <a:schemeClr val="tx1"/>
+          </a:fontRef>
+        </p:style>
+      </p:cxnSp>
+      <p:cxnSp>
+        <p:nvCxnSpPr>
+          <p:cNvPr id="15" name="Gerade Verbindung mit Pfeil 14">
+            <a:extLst>
+              <a:ext uri="{FF2B5EF4-FFF2-40B4-BE49-F238E27FC236}">
+                <a16:creationId xmlns:a16="http://schemas.microsoft.com/office/drawing/2014/main" id="{AD413769-BB17-E723-D409-78F22B281DDE}"/>
+              </a:ext>
+            </a:extLst>
+          </p:cNvPr>
+          <p:cNvCxnSpPr>
+            <a:cxnSpLocks/>
+          </p:cNvCxnSpPr>
+          <p:nvPr/>
+        </p:nvCxnSpPr>
+        <p:spPr>
+          <a:xfrm>
+            <a:off x="6145530" y="3314700"/>
+            <a:ext cx="358140" cy="407670"/>
+          </a:xfrm>
+          <a:prstGeom prst="straightConnector1">
+            <a:avLst/>
+          </a:prstGeom>
+          <a:ln w="9525" cap="flat" cmpd="sng" algn="ctr">
+            <a:solidFill>
+              <a:schemeClr val="dk1"/>
+            </a:solidFill>
+            <a:prstDash val="solid"/>
+            <a:round/>
+            <a:headEnd type="none" w="med" len="med"/>
+            <a:tailEnd type="arrow" w="med" len="med"/>
+          </a:ln>
+        </p:spPr>
+        <p:style>
+          <a:lnRef idx="0">
+            <a:scrgbClr r="0" g="0" b="0"/>
+          </a:lnRef>
+          <a:fillRef idx="0">
+            <a:scrgbClr r="0" g="0" b="0"/>
+          </a:fillRef>
+          <a:effectRef idx="0">
+            <a:scrgbClr r="0" g="0" b="0"/>
+          </a:effectRef>
+          <a:fontRef idx="minor">
+            <a:schemeClr val="tx1"/>
+          </a:fontRef>
+        </p:style>
+      </p:cxnSp>
+      <p:pic>
+        <p:nvPicPr>
+          <p:cNvPr id="4" name="Grafik 3">
+            <a:extLst>
+              <a:ext uri="{FF2B5EF4-FFF2-40B4-BE49-F238E27FC236}">
+                <a16:creationId xmlns:a16="http://schemas.microsoft.com/office/drawing/2014/main" id="{73B4397B-5D9A-639E-4B07-BD6CECF3C9EA}"/>
+              </a:ext>
+            </a:extLst>
+          </p:cNvPr>
+          <p:cNvPicPr>
+            <a:picLocks noChangeAspect="1"/>
+          </p:cNvPicPr>
+          <p:nvPr/>
+        </p:nvPicPr>
+        <p:blipFill>
+          <a:blip r:embed="rId2">
+            <a:extLst>
+              <a:ext uri="{28A0092B-C50C-407E-A947-70E740481C1C}">
+                <a14:useLocalDpi xmlns:a14="http://schemas.microsoft.com/office/drawing/2010/main" val="0"/>
+              </a:ext>
+              <a:ext uri="{96DAC541-7B7A-43D3-8B79-37D633B846F1}">
+                <asvg:svgBlip xmlns:asvg="http://schemas.microsoft.com/office/drawing/2016/SVG/main" r:embed="rId3"/>
+              </a:ext>
+            </a:extLst>
+          </a:blip>
+          <a:stretch>
+            <a:fillRect/>
+          </a:stretch>
+        </p:blipFill>
+        <p:spPr>
+          <a:xfrm>
+            <a:off x="8342797" y="-2987040"/>
+            <a:ext cx="6505575" cy="6505575"/>
+          </a:xfrm>
+          <a:prstGeom prst="rect">
+            <a:avLst/>
+          </a:prstGeom>
+        </p:spPr>
+      </p:pic>
+      <p:sp>
+        <p:nvSpPr>
+          <p:cNvPr id="12" name="Freihandform: Form 11">
+            <a:extLst>
+              <a:ext uri="{FF2B5EF4-FFF2-40B4-BE49-F238E27FC236}">
+                <a16:creationId xmlns:a16="http://schemas.microsoft.com/office/drawing/2014/main" id="{C0AA08C5-58F2-26E5-CBE8-61ED45C2D690}"/>
+              </a:ext>
+            </a:extLst>
+          </p:cNvPr>
+          <p:cNvSpPr/>
+          <p:nvPr/>
+        </p:nvSpPr>
+        <p:spPr>
+          <a:xfrm>
+            <a:off x="64624" y="-3240134"/>
+            <a:ext cx="4765939" cy="2434926"/>
+          </a:xfrm>
+          <a:custGeom>
+            <a:avLst/>
+            <a:gdLst>
+              <a:gd name="connsiteX0" fmla="*/ 3760853 w 4765939"/>
+              <a:gd name="connsiteY0" fmla="*/ 0 h 2434926"/>
+              <a:gd name="connsiteX1" fmla="*/ 3794968 w 4765939"/>
+              <a:gd name="connsiteY1" fmla="*/ 35181 h 2434926"/>
+              <a:gd name="connsiteX2" fmla="*/ 4686586 w 4765939"/>
+              <a:gd name="connsiteY2" fmla="*/ 928306 h 2434926"/>
+              <a:gd name="connsiteX3" fmla="*/ 4753696 w 4765939"/>
+              <a:gd name="connsiteY3" fmla="*/ 1026287 h 2434926"/>
+              <a:gd name="connsiteX4" fmla="*/ 4697461 w 4765939"/>
+              <a:gd name="connsiteY4" fmla="*/ 1222733 h 2434926"/>
+              <a:gd name="connsiteX5" fmla="*/ 3779447 w 4765939"/>
+              <a:gd name="connsiteY5" fmla="*/ 2143301 h 2434926"/>
+              <a:gd name="connsiteX6" fmla="*/ 3718359 w 4765939"/>
+              <a:gd name="connsiteY6" fmla="*/ 2140798 h 2434926"/>
+              <a:gd name="connsiteX7" fmla="*/ 3529550 w 4765939"/>
+              <a:gd name="connsiteY7" fmla="*/ 1952554 h 2434926"/>
+              <a:gd name="connsiteX8" fmla="*/ 3531537 w 4765939"/>
+              <a:gd name="connsiteY8" fmla="*/ 1884321 h 2434926"/>
+              <a:gd name="connsiteX9" fmla="*/ 4121643 w 4765939"/>
+              <a:gd name="connsiteY9" fmla="*/ 1295840 h 2434926"/>
+              <a:gd name="connsiteX10" fmla="*/ 4157632 w 4765939"/>
+              <a:gd name="connsiteY10" fmla="*/ 1268043 h 2434926"/>
+              <a:gd name="connsiteX11" fmla="*/ 4150453 w 4765939"/>
+              <a:gd name="connsiteY11" fmla="*/ 1257300 h 2434926"/>
+              <a:gd name="connsiteX12" fmla="*/ 4100094 w 4765939"/>
+              <a:gd name="connsiteY12" fmla="*/ 1257300 h 2434926"/>
+              <a:gd name="connsiteX13" fmla="*/ 842660 w 4765939"/>
+              <a:gd name="connsiteY13" fmla="*/ 1257256 h 2434926"/>
+              <a:gd name="connsiteX14" fmla="*/ 541635 w 4765939"/>
+              <a:gd name="connsiteY14" fmla="*/ 1368605 h 2434926"/>
+              <a:gd name="connsiteX15" fmla="*/ 359063 w 4765939"/>
+              <a:gd name="connsiteY15" fmla="*/ 1658487 h 2434926"/>
+              <a:gd name="connsiteX16" fmla="*/ 345546 w 4765939"/>
+              <a:gd name="connsiteY16" fmla="*/ 1798095 h 2434926"/>
+              <a:gd name="connsiteX17" fmla="*/ 344950 w 4765939"/>
+              <a:gd name="connsiteY17" fmla="*/ 2434927 h 2434926"/>
+              <a:gd name="connsiteX18" fmla="*/ 4736 w 4765939"/>
+              <a:gd name="connsiteY18" fmla="*/ 2434927 h 2434926"/>
+              <a:gd name="connsiteX19" fmla="*/ 2176 w 4765939"/>
+              <a:gd name="connsiteY19" fmla="*/ 2402232 h 2434926"/>
+              <a:gd name="connsiteX20" fmla="*/ 3960 w 4765939"/>
+              <a:gd name="connsiteY20" fmla="*/ 1697470 h 2434926"/>
+              <a:gd name="connsiteX21" fmla="*/ 176409 w 4765939"/>
+              <a:gd name="connsiteY21" fmla="*/ 1239409 h 2434926"/>
+              <a:gd name="connsiteX22" fmla="*/ 455517 w 4765939"/>
+              <a:gd name="connsiteY22" fmla="*/ 1003067 h 2434926"/>
+              <a:gd name="connsiteX23" fmla="*/ 748239 w 4765939"/>
+              <a:gd name="connsiteY23" fmla="*/ 914838 h 2434926"/>
+              <a:gd name="connsiteX24" fmla="*/ 1045818 w 4765939"/>
+              <a:gd name="connsiteY24" fmla="*/ 905291 h 2434926"/>
+              <a:gd name="connsiteX25" fmla="*/ 4098471 w 4765939"/>
+              <a:gd name="connsiteY25" fmla="*/ 904875 h 2434926"/>
+              <a:gd name="connsiteX26" fmla="*/ 4158147 w 4765939"/>
+              <a:gd name="connsiteY26" fmla="*/ 904875 h 2434926"/>
+              <a:gd name="connsiteX27" fmla="*/ 4122569 w 4765939"/>
+              <a:gd name="connsiteY27" fmla="*/ 867704 h 2434926"/>
+              <a:gd name="connsiteX28" fmla="*/ 3532695 w 4765939"/>
+              <a:gd name="connsiteY28" fmla="*/ 278990 h 2434926"/>
+              <a:gd name="connsiteX29" fmla="*/ 3531761 w 4765939"/>
+              <a:gd name="connsiteY29" fmla="*/ 207389 h 2434926"/>
+              <a:gd name="connsiteX30" fmla="*/ 3735183 w 4765939"/>
+              <a:gd name="connsiteY30" fmla="*/ 3156 h 2434926"/>
+              <a:gd name="connsiteX31" fmla="*/ 3760853 w 4765939"/>
+              <a:gd name="connsiteY31" fmla="*/ 0 h 2434926"/>
+            </a:gdLst>
+            <a:ahLst/>
+            <a:cxnLst>
+              <a:cxn ang="0">
+                <a:pos x="connsiteX0" y="connsiteY0"/>
+              </a:cxn>
+              <a:cxn ang="0">
+                <a:pos x="connsiteX1" y="connsiteY1"/>
+              </a:cxn>
+              <a:cxn ang="0">
+                <a:pos x="connsiteX2" y="connsiteY2"/>
+              </a:cxn>
+              <a:cxn ang="0">
+                <a:pos x="connsiteX3" y="connsiteY3"/>
+              </a:cxn>
+              <a:cxn ang="0">
+                <a:pos x="connsiteX4" y="connsiteY4"/>
+              </a:cxn>
+              <a:cxn ang="0">
+                <a:pos x="connsiteX5" y="connsiteY5"/>
+              </a:cxn>
+              <a:cxn ang="0">
+                <a:pos x="connsiteX6" y="connsiteY6"/>
+              </a:cxn>
+              <a:cxn ang="0">
+                <a:pos x="connsiteX7" y="connsiteY7"/>
+              </a:cxn>
+              <a:cxn ang="0">
+                <a:pos x="connsiteX8" y="connsiteY8"/>
+              </a:cxn>
+              <a:cxn ang="0">
+                <a:pos x="connsiteX9" y="connsiteY9"/>
+              </a:cxn>
+              <a:cxn ang="0">
+                <a:pos x="connsiteX10" y="connsiteY10"/>
+              </a:cxn>
+              <a:cxn ang="0">
+                <a:pos x="connsiteX11" y="connsiteY11"/>
+              </a:cxn>
+              <a:cxn ang="0">
+                <a:pos x="connsiteX12" y="connsiteY12"/>
+              </a:cxn>
+              <a:cxn ang="0">
+                <a:pos x="connsiteX13" y="connsiteY13"/>
+              </a:cxn>
+              <a:cxn ang="0">
+                <a:pos x="connsiteX14" y="connsiteY14"/>
+              </a:cxn>
+              <a:cxn ang="0">
+                <a:pos x="connsiteX15" y="connsiteY15"/>
+              </a:cxn>
+              <a:cxn ang="0">
+                <a:pos x="connsiteX16" y="connsiteY16"/>
+              </a:cxn>
+              <a:cxn ang="0">
+                <a:pos x="connsiteX17" y="connsiteY17"/>
+              </a:cxn>
+              <a:cxn ang="0">
+                <a:pos x="connsiteX18" y="connsiteY18"/>
+              </a:cxn>
+              <a:cxn ang="0">
+                <a:pos x="connsiteX19" y="connsiteY19"/>
+              </a:cxn>
+              <a:cxn ang="0">
+                <a:pos x="connsiteX20" y="connsiteY20"/>
+              </a:cxn>
+              <a:cxn ang="0">
+                <a:pos x="connsiteX21" y="connsiteY21"/>
+              </a:cxn>
+              <a:cxn ang="0">
+                <a:pos x="connsiteX22" y="connsiteY22"/>
+              </a:cxn>
+              <a:cxn ang="0">
+                <a:pos x="connsiteX23" y="connsiteY23"/>
+              </a:cxn>
+              <a:cxn ang="0">
+                <a:pos x="connsiteX24" y="connsiteY24"/>
+              </a:cxn>
+              <a:cxn ang="0">
+                <a:pos x="connsiteX25" y="connsiteY25"/>
+              </a:cxn>
+              <a:cxn ang="0">
+                <a:pos x="connsiteX26" y="connsiteY26"/>
+              </a:cxn>
+              <a:cxn ang="0">
+                <a:pos x="connsiteX27" y="connsiteY27"/>
+              </a:cxn>
+              <a:cxn ang="0">
+                <a:pos x="connsiteX28" y="connsiteY28"/>
+              </a:cxn>
+              <a:cxn ang="0">
+                <a:pos x="connsiteX29" y="connsiteY29"/>
+              </a:cxn>
+              <a:cxn ang="0">
+                <a:pos x="connsiteX30" y="connsiteY30"/>
+              </a:cxn>
+              <a:cxn ang="0">
+                <a:pos x="connsiteX31" y="connsiteY31"/>
+              </a:cxn>
+            </a:cxnLst>
+            <a:rect l="l" t="t" r="r" b="b"/>
+            <a:pathLst>
+              <a:path w="4765939" h="2434926">
+                <a:moveTo>
+                  <a:pt x="3760853" y="0"/>
+                </a:moveTo>
+                <a:cubicBezTo>
+                  <a:pt x="3774572" y="11761"/>
+                  <a:pt x="3784018" y="24222"/>
+                  <a:pt x="3794968" y="35181"/>
+                </a:cubicBezTo>
+                <a:cubicBezTo>
+                  <a:pt x="4092301" y="332763"/>
+                  <a:pt x="4390189" y="629794"/>
+                  <a:pt x="4686586" y="928306"/>
+                </a:cubicBezTo>
+                <a:cubicBezTo>
+                  <a:pt x="4714147" y="956062"/>
+                  <a:pt x="4738738" y="990409"/>
+                  <a:pt x="4753696" y="1026287"/>
+                </a:cubicBezTo>
+                <a:cubicBezTo>
+                  <a:pt x="4786081" y="1103964"/>
+                  <a:pt x="4749694" y="1169996"/>
+                  <a:pt x="4697461" y="1222733"/>
+                </a:cubicBezTo>
+                <a:cubicBezTo>
+                  <a:pt x="4392507" y="1530629"/>
+                  <a:pt x="4085026" y="1836020"/>
+                  <a:pt x="3779447" y="2143301"/>
+                </a:cubicBezTo>
+                <a:cubicBezTo>
+                  <a:pt x="3754050" y="2168839"/>
+                  <a:pt x="3739996" y="2163212"/>
+                  <a:pt x="3718359" y="2140798"/>
+                </a:cubicBezTo>
+                <a:cubicBezTo>
+                  <a:pt x="3656636" y="2076859"/>
+                  <a:pt x="3594322" y="2013360"/>
+                  <a:pt x="3529550" y="1952554"/>
+                </a:cubicBezTo>
+                <a:cubicBezTo>
+                  <a:pt x="3500728" y="1925498"/>
+                  <a:pt x="3505872" y="1909727"/>
+                  <a:pt x="3531537" y="1884321"/>
+                </a:cubicBezTo>
+                <a:cubicBezTo>
+                  <a:pt x="3728959" y="1688889"/>
+                  <a:pt x="3924929" y="1491989"/>
+                  <a:pt x="4121643" y="1295840"/>
+                </a:cubicBezTo>
+                <a:cubicBezTo>
+                  <a:pt x="4132291" y="1285222"/>
+                  <a:pt x="4145575" y="1277248"/>
+                  <a:pt x="4157632" y="1268043"/>
+                </a:cubicBezTo>
+                <a:cubicBezTo>
+                  <a:pt x="4155239" y="1264462"/>
+                  <a:pt x="4152846" y="1260881"/>
+                  <a:pt x="4150453" y="1257300"/>
+                </a:cubicBezTo>
+                <a:cubicBezTo>
+                  <a:pt x="4133666" y="1257300"/>
+                  <a:pt x="4116881" y="1257300"/>
+                  <a:pt x="4100094" y="1257300"/>
+                </a:cubicBezTo>
+                <a:cubicBezTo>
+                  <a:pt x="3014283" y="1257300"/>
+                  <a:pt x="1928472" y="1257330"/>
+                  <a:pt x="842660" y="1257256"/>
+                </a:cubicBezTo>
+                <a:cubicBezTo>
+                  <a:pt x="728454" y="1257248"/>
+                  <a:pt x="631212" y="1298600"/>
+                  <a:pt x="541635" y="1368605"/>
+                </a:cubicBezTo>
+                <a:cubicBezTo>
+                  <a:pt x="444881" y="1444219"/>
+                  <a:pt x="386238" y="1541589"/>
+                  <a:pt x="359063" y="1658487"/>
+                </a:cubicBezTo>
+                <a:cubicBezTo>
+                  <a:pt x="348559" y="1703674"/>
+                  <a:pt x="345848" y="1751456"/>
+                  <a:pt x="345546" y="1798095"/>
+                </a:cubicBezTo>
+                <a:cubicBezTo>
+                  <a:pt x="344183" y="2009207"/>
+                  <a:pt x="344950" y="2220333"/>
+                  <a:pt x="344950" y="2434927"/>
+                </a:cubicBezTo>
+                <a:cubicBezTo>
+                  <a:pt x="232623" y="2434927"/>
+                  <a:pt x="120778" y="2434927"/>
+                  <a:pt x="4736" y="2434927"/>
+                </a:cubicBezTo>
+                <a:cubicBezTo>
+                  <a:pt x="4012" y="2426113"/>
+                  <a:pt x="2184" y="2414173"/>
+                  <a:pt x="2176" y="2402232"/>
+                </a:cubicBezTo>
+                <a:cubicBezTo>
+                  <a:pt x="2007" y="2167291"/>
+                  <a:pt x="-3640" y="1932165"/>
+                  <a:pt x="3960" y="1697470"/>
+                </a:cubicBezTo>
+                <a:cubicBezTo>
+                  <a:pt x="9442" y="1528180"/>
+                  <a:pt x="72437" y="1375129"/>
+                  <a:pt x="176409" y="1239409"/>
+                </a:cubicBezTo>
+                <a:cubicBezTo>
+                  <a:pt x="252576" y="1139986"/>
+                  <a:pt x="345997" y="1060263"/>
+                  <a:pt x="455517" y="1003067"/>
+                </a:cubicBezTo>
+                <a:cubicBezTo>
+                  <a:pt x="546240" y="955688"/>
+                  <a:pt x="643894" y="920334"/>
+                  <a:pt x="748239" y="914838"/>
+                </a:cubicBezTo>
+                <a:cubicBezTo>
+                  <a:pt x="847332" y="909619"/>
+                  <a:pt x="946615" y="905357"/>
+                  <a:pt x="1045818" y="905291"/>
+                </a:cubicBezTo>
+                <a:cubicBezTo>
+                  <a:pt x="2063369" y="904613"/>
+                  <a:pt x="3080920" y="904875"/>
+                  <a:pt x="4098471" y="904875"/>
+                </a:cubicBezTo>
+                <a:cubicBezTo>
+                  <a:pt x="4115548" y="904875"/>
+                  <a:pt x="4132624" y="904875"/>
+                  <a:pt x="4158147" y="904875"/>
+                </a:cubicBezTo>
+                <a:cubicBezTo>
+                  <a:pt x="4142974" y="888996"/>
+                  <a:pt x="4132991" y="878130"/>
+                  <a:pt x="4122569" y="867704"/>
+                </a:cubicBezTo>
+                <a:cubicBezTo>
+                  <a:pt x="3926164" y="671245"/>
+                  <a:pt x="3730198" y="474340"/>
+                  <a:pt x="3532695" y="278990"/>
+                </a:cubicBezTo>
+                <a:cubicBezTo>
+                  <a:pt x="3505187" y="251782"/>
+                  <a:pt x="3501672" y="235533"/>
+                  <a:pt x="3531761" y="207389"/>
+                </a:cubicBezTo>
+                <a:cubicBezTo>
+                  <a:pt x="3601247" y="142396"/>
+                  <a:pt x="3667155" y="73579"/>
+                  <a:pt x="3735183" y="3156"/>
+                </a:cubicBezTo>
+                <a:cubicBezTo>
+                  <a:pt x="3742994" y="0"/>
+                  <a:pt x="3750138" y="0"/>
+                  <a:pt x="3760853" y="0"/>
+                </a:cubicBezTo>
+                <a:close/>
+              </a:path>
+            </a:pathLst>
+          </a:custGeom>
+          <a:solidFill>
+            <a:srgbClr val="000000"/>
+          </a:solidFill>
+          <a:ln w="9525" cap="flat">
+            <a:noFill/>
+            <a:prstDash val="solid"/>
+            <a:miter/>
+          </a:ln>
+        </p:spPr>
+        <p:txBody>
+          <a:bodyPr rtlCol="0" anchor="ctr"/>
+          <a:lstStyle/>
+          <a:p>
+            <a:endParaRPr lang="de-DE"/>
+          </a:p>
+        </p:txBody>
+      </p:sp>
+      <p:sp>
+        <p:nvSpPr>
+          <p:cNvPr id="13" name="Freihandform: Form 12">
+            <a:extLst>
+              <a:ext uri="{FF2B5EF4-FFF2-40B4-BE49-F238E27FC236}">
+                <a16:creationId xmlns:a16="http://schemas.microsoft.com/office/drawing/2014/main" id="{50580171-08FA-4121-B2F1-ACDD7B01E04C}"/>
+              </a:ext>
+            </a:extLst>
+          </p:cNvPr>
+          <p:cNvSpPr/>
+          <p:nvPr/>
+        </p:nvSpPr>
+        <p:spPr>
+          <a:xfrm>
+            <a:off x="68253" y="-799196"/>
+            <a:ext cx="4761190" cy="2435862"/>
+          </a:xfrm>
+          <a:custGeom>
+            <a:avLst/>
+            <a:gdLst>
+              <a:gd name="connsiteX0" fmla="*/ 1002119 w 4761190"/>
+              <a:gd name="connsiteY0" fmla="*/ 2435863 h 2435862"/>
+              <a:gd name="connsiteX1" fmla="*/ 968008 w 4761190"/>
+              <a:gd name="connsiteY1" fmla="*/ 2400685 h 2435862"/>
+              <a:gd name="connsiteX2" fmla="*/ 58201 w 4761190"/>
+              <a:gd name="connsiteY2" fmla="*/ 1492237 h 2435862"/>
+              <a:gd name="connsiteX3" fmla="*/ 59676 w 4761190"/>
+              <a:gd name="connsiteY3" fmla="*/ 1215867 h 2435862"/>
+              <a:gd name="connsiteX4" fmla="*/ 975619 w 4761190"/>
+              <a:gd name="connsiteY4" fmla="*/ 300095 h 2435862"/>
+              <a:gd name="connsiteX5" fmla="*/ 1050531 w 4761190"/>
+              <a:gd name="connsiteY5" fmla="*/ 300634 h 2435862"/>
+              <a:gd name="connsiteX6" fmla="*/ 1259988 w 4761190"/>
+              <a:gd name="connsiteY6" fmla="*/ 511449 h 2435862"/>
+              <a:gd name="connsiteX7" fmla="*/ 592447 w 4761190"/>
+              <a:gd name="connsiteY7" fmla="*/ 1178563 h 2435862"/>
+              <a:gd name="connsiteX8" fmla="*/ 647893 w 4761190"/>
+              <a:gd name="connsiteY8" fmla="*/ 1178563 h 2435862"/>
+              <a:gd name="connsiteX9" fmla="*/ 3928852 w 4761190"/>
+              <a:gd name="connsiteY9" fmla="*/ 1177965 h 2435862"/>
+              <a:gd name="connsiteX10" fmla="*/ 4223455 w 4761190"/>
+              <a:gd name="connsiteY10" fmla="*/ 1063601 h 2435862"/>
+              <a:gd name="connsiteX11" fmla="*/ 4409446 w 4761190"/>
+              <a:gd name="connsiteY11" fmla="*/ 644577 h 2435862"/>
+              <a:gd name="connsiteX12" fmla="*/ 4408497 w 4761190"/>
+              <a:gd name="connsiteY12" fmla="*/ 0 h 2435862"/>
+              <a:gd name="connsiteX13" fmla="*/ 4760922 w 4761190"/>
+              <a:gd name="connsiteY13" fmla="*/ 0 h 2435862"/>
+              <a:gd name="connsiteX14" fmla="*/ 4760922 w 4761190"/>
+              <a:gd name="connsiteY14" fmla="*/ 41004 h 2435862"/>
+              <a:gd name="connsiteX15" fmla="*/ 4761168 w 4761190"/>
+              <a:gd name="connsiteY15" fmla="*/ 621957 h 2435862"/>
+              <a:gd name="connsiteX16" fmla="*/ 4617438 w 4761190"/>
+              <a:gd name="connsiteY16" fmla="*/ 1149268 h 2435862"/>
+              <a:gd name="connsiteX17" fmla="*/ 4123838 w 4761190"/>
+              <a:gd name="connsiteY17" fmla="*/ 1500497 h 2435862"/>
+              <a:gd name="connsiteX18" fmla="*/ 3860457 w 4761190"/>
+              <a:gd name="connsiteY18" fmla="*/ 1529750 h 2435862"/>
+              <a:gd name="connsiteX19" fmla="*/ 655690 w 4761190"/>
+              <a:gd name="connsiteY19" fmla="*/ 1530988 h 2435862"/>
+              <a:gd name="connsiteX20" fmla="*/ 606425 w 4761190"/>
+              <a:gd name="connsiteY20" fmla="*/ 1530988 h 2435862"/>
+              <a:gd name="connsiteX21" fmla="*/ 1266933 w 4761190"/>
+              <a:gd name="connsiteY21" fmla="*/ 2190986 h 2435862"/>
+              <a:gd name="connsiteX22" fmla="*/ 1027789 w 4761190"/>
+              <a:gd name="connsiteY22" fmla="*/ 2432707 h 2435862"/>
+              <a:gd name="connsiteX23" fmla="*/ 1002119 w 4761190"/>
+              <a:gd name="connsiteY23" fmla="*/ 2435863 h 2435862"/>
+            </a:gdLst>
+            <a:ahLst/>
+            <a:cxnLst>
+              <a:cxn ang="0">
+                <a:pos x="connsiteX0" y="connsiteY0"/>
+              </a:cxn>
+              <a:cxn ang="0">
+                <a:pos x="connsiteX1" y="connsiteY1"/>
+              </a:cxn>
+              <a:cxn ang="0">
+                <a:pos x="connsiteX2" y="connsiteY2"/>
+              </a:cxn>
+              <a:cxn ang="0">
+                <a:pos x="connsiteX3" y="connsiteY3"/>
+              </a:cxn>
+              <a:cxn ang="0">
+                <a:pos x="connsiteX4" y="connsiteY4"/>
+              </a:cxn>
+              <a:cxn ang="0">
+                <a:pos x="connsiteX5" y="connsiteY5"/>
+              </a:cxn>
+              <a:cxn ang="0">
+                <a:pos x="connsiteX6" y="connsiteY6"/>
+              </a:cxn>
+              <a:cxn ang="0">
+                <a:pos x="connsiteX7" y="connsiteY7"/>
+              </a:cxn>
+              <a:cxn ang="0">
+                <a:pos x="connsiteX8" y="connsiteY8"/>
+              </a:cxn>
+              <a:cxn ang="0">
+                <a:pos x="connsiteX9" y="connsiteY9"/>
+              </a:cxn>
+              <a:cxn ang="0">
+                <a:pos x="connsiteX10" y="connsiteY10"/>
+              </a:cxn>
+              <a:cxn ang="0">
+                <a:pos x="connsiteX11" y="connsiteY11"/>
+              </a:cxn>
+              <a:cxn ang="0">
+                <a:pos x="connsiteX12" y="connsiteY12"/>
+              </a:cxn>
+              <a:cxn ang="0">
+                <a:pos x="connsiteX13" y="connsiteY13"/>
+              </a:cxn>
+              <a:cxn ang="0">
+                <a:pos x="connsiteX14" y="connsiteY14"/>
+              </a:cxn>
+              <a:cxn ang="0">
+                <a:pos x="connsiteX15" y="connsiteY15"/>
+              </a:cxn>
+              <a:cxn ang="0">
+                <a:pos x="connsiteX16" y="connsiteY16"/>
+              </a:cxn>
+              <a:cxn ang="0">
+                <a:pos x="connsiteX17" y="connsiteY17"/>
+              </a:cxn>
+              <a:cxn ang="0">
+                <a:pos x="connsiteX18" y="connsiteY18"/>
+              </a:cxn>
+              <a:cxn ang="0">
+                <a:pos x="connsiteX19" y="connsiteY19"/>
+              </a:cxn>
+              <a:cxn ang="0">
+                <a:pos x="connsiteX20" y="connsiteY20"/>
+              </a:cxn>
+              <a:cxn ang="0">
+                <a:pos x="connsiteX21" y="connsiteY21"/>
+              </a:cxn>
+              <a:cxn ang="0">
+                <a:pos x="connsiteX22" y="connsiteY22"/>
+              </a:cxn>
+              <a:cxn ang="0">
+                <a:pos x="connsiteX23" y="connsiteY23"/>
+              </a:cxn>
+            </a:cxnLst>
+            <a:rect l="l" t="t" r="r" b="b"/>
+            <a:pathLst>
+              <a:path w="4761190" h="2435862">
+                <a:moveTo>
+                  <a:pt x="1002119" y="2435863"/>
+                </a:moveTo>
+                <a:cubicBezTo>
+                  <a:pt x="988401" y="2424103"/>
+                  <a:pt x="978957" y="2411642"/>
+                  <a:pt x="968008" y="2400685"/>
+                </a:cubicBezTo>
+                <a:cubicBezTo>
+                  <a:pt x="665069" y="2097535"/>
+                  <a:pt x="363083" y="1793421"/>
+                  <a:pt x="58201" y="1492237"/>
+                </a:cubicBezTo>
+                <a:cubicBezTo>
+                  <a:pt x="-27223" y="1407849"/>
+                  <a:pt x="-11606" y="1286401"/>
+                  <a:pt x="59676" y="1215867"/>
+                </a:cubicBezTo>
+                <a:cubicBezTo>
+                  <a:pt x="366567" y="912200"/>
+                  <a:pt x="671430" y="606474"/>
+                  <a:pt x="975619" y="300095"/>
+                </a:cubicBezTo>
+                <a:cubicBezTo>
+                  <a:pt x="1005541" y="269957"/>
+                  <a:pt x="1022051" y="270352"/>
+                  <a:pt x="1050531" y="300634"/>
+                </a:cubicBezTo>
+                <a:cubicBezTo>
+                  <a:pt x="1117671" y="372024"/>
+                  <a:pt x="1188491" y="439954"/>
+                  <a:pt x="1259988" y="511449"/>
+                </a:cubicBezTo>
+                <a:cubicBezTo>
+                  <a:pt x="1038304" y="732991"/>
+                  <a:pt x="819043" y="952112"/>
+                  <a:pt x="592447" y="1178563"/>
+                </a:cubicBezTo>
+                <a:cubicBezTo>
+                  <a:pt x="617667" y="1178563"/>
+                  <a:pt x="632780" y="1178563"/>
+                  <a:pt x="647893" y="1178563"/>
+                </a:cubicBezTo>
+                <a:cubicBezTo>
+                  <a:pt x="1741546" y="1178563"/>
+                  <a:pt x="2835199" y="1178956"/>
+                  <a:pt x="3928852" y="1177965"/>
+                </a:cubicBezTo>
+                <a:cubicBezTo>
+                  <a:pt x="4040232" y="1177864"/>
+                  <a:pt x="4138313" y="1135494"/>
+                  <a:pt x="4223455" y="1063601"/>
+                </a:cubicBezTo>
+                <a:cubicBezTo>
+                  <a:pt x="4353273" y="953983"/>
+                  <a:pt x="4412585" y="815035"/>
+                  <a:pt x="4409446" y="644577"/>
+                </a:cubicBezTo>
+                <a:cubicBezTo>
+                  <a:pt x="4405505" y="430627"/>
+                  <a:pt x="4408497" y="216550"/>
+                  <a:pt x="4408497" y="0"/>
+                </a:cubicBezTo>
+                <a:cubicBezTo>
+                  <a:pt x="4525923" y="0"/>
+                  <a:pt x="4640903" y="0"/>
+                  <a:pt x="4760922" y="0"/>
+                </a:cubicBezTo>
+                <a:cubicBezTo>
+                  <a:pt x="4760922" y="13620"/>
+                  <a:pt x="4760922" y="27312"/>
+                  <a:pt x="4760922" y="41004"/>
+                </a:cubicBezTo>
+                <a:cubicBezTo>
+                  <a:pt x="4760922" y="234656"/>
+                  <a:pt x="4760056" y="428312"/>
+                  <a:pt x="4761168" y="621957"/>
+                </a:cubicBezTo>
+                <a:cubicBezTo>
+                  <a:pt x="4762255" y="811364"/>
+                  <a:pt x="4724075" y="990537"/>
+                  <a:pt x="4617438" y="1149268"/>
+                </a:cubicBezTo>
+                <a:cubicBezTo>
+                  <a:pt x="4497656" y="1327564"/>
+                  <a:pt x="4332716" y="1448744"/>
+                  <a:pt x="4123838" y="1500497"/>
+                </a:cubicBezTo>
+                <a:cubicBezTo>
+                  <a:pt x="4038750" y="1521579"/>
+                  <a:pt x="3948424" y="1529593"/>
+                  <a:pt x="3860457" y="1529750"/>
+                </a:cubicBezTo>
+                <a:cubicBezTo>
+                  <a:pt x="2792204" y="1531658"/>
+                  <a:pt x="1723947" y="1530988"/>
+                  <a:pt x="655690" y="1530988"/>
+                </a:cubicBezTo>
+                <a:cubicBezTo>
+                  <a:pt x="638483" y="1530988"/>
+                  <a:pt x="621275" y="1530988"/>
+                  <a:pt x="606425" y="1530988"/>
+                </a:cubicBezTo>
+                <a:cubicBezTo>
+                  <a:pt x="825037" y="1749431"/>
+                  <a:pt x="1044051" y="1968276"/>
+                  <a:pt x="1266933" y="2190986"/>
+                </a:cubicBezTo>
+                <a:cubicBezTo>
+                  <a:pt x="1182348" y="2275602"/>
+                  <a:pt x="1105403" y="2352576"/>
+                  <a:pt x="1027789" y="2432707"/>
+                </a:cubicBezTo>
+                <a:cubicBezTo>
+                  <a:pt x="1019978" y="2435863"/>
+                  <a:pt x="1012834" y="2435863"/>
+                  <a:pt x="1002119" y="2435863"/>
+                </a:cubicBezTo>
+                <a:close/>
+              </a:path>
+            </a:pathLst>
+          </a:custGeom>
+          <a:solidFill>
+            <a:srgbClr val="000000"/>
+          </a:solidFill>
+          <a:ln w="9525" cap="flat">
+            <a:noFill/>
+            <a:prstDash val="solid"/>
+            <a:miter/>
+          </a:ln>
+        </p:spPr>
+        <p:txBody>
+          <a:bodyPr rtlCol="0" anchor="ctr"/>
+          <a:lstStyle/>
+          <a:p>
+            <a:endParaRPr lang="de-DE"/>
+          </a:p>
+        </p:txBody>
+      </p:sp>
+      <p:pic>
+        <p:nvPicPr>
+          <p:cNvPr id="16" name="Grafik 15">
+            <a:extLst>
+              <a:ext uri="{FF2B5EF4-FFF2-40B4-BE49-F238E27FC236}">
+                <a16:creationId xmlns:a16="http://schemas.microsoft.com/office/drawing/2014/main" id="{D732473D-4B7B-56E2-EA00-BCEE5FCCEFB7}"/>
+              </a:ext>
+            </a:extLst>
+          </p:cNvPr>
+          <p:cNvPicPr>
+            <a:picLocks noChangeAspect="1"/>
+          </p:cNvPicPr>
+          <p:nvPr/>
+        </p:nvPicPr>
+        <p:blipFill>
+          <a:blip r:embed="rId4">
+            <a:extLst>
+              <a:ext uri="{28A0092B-C50C-407E-A947-70E740481C1C}">
+                <a14:useLocalDpi xmlns:a14="http://schemas.microsoft.com/office/drawing/2010/main" val="0"/>
+              </a:ext>
+              <a:ext uri="{96DAC541-7B7A-43D3-8B79-37D633B846F1}">
+                <asvg:svgBlip xmlns:asvg="http://schemas.microsoft.com/office/drawing/2016/SVG/main" r:embed="rId5"/>
+              </a:ext>
+            </a:extLst>
+          </a:blip>
+          <a:stretch>
+            <a:fillRect/>
+          </a:stretch>
+        </p:blipFill>
+        <p:spPr>
+          <a:xfrm>
+            <a:off x="14932668" y="-153244"/>
+            <a:ext cx="4781550" cy="4895850"/>
+          </a:xfrm>
+          <a:prstGeom prst="rect">
+            <a:avLst/>
+          </a:prstGeom>
+        </p:spPr>
+      </p:pic>
     </p:spTree>
     <p:extLst>
       <p:ext uri="{BB962C8B-B14F-4D97-AF65-F5344CB8AC3E}">

</xml_diff>

<commit_message>
MP3 Final Design. Last coming update will adress the input button fixing previous input issues like accumulation of tracks with previous inputs
</commit_message>
<xml_diff>
--- a/Wallpaper/Music Player Icons Selfmade.pptx
+++ b/Wallpaper/Music Player Icons Selfmade.pptx
@@ -10,6 +10,8 @@
     <p:sldId id="258" r:id="rId4"/>
     <p:sldId id="259" r:id="rId5"/>
     <p:sldId id="260" r:id="rId6"/>
+    <p:sldId id="261" r:id="rId7"/>
+    <p:sldId id="262" r:id="rId8"/>
   </p:sldIdLst>
   <p:sldSz cx="12192000" cy="6858000"/>
   <p:notesSz cx="6858000" cy="9144000"/>
@@ -5576,6 +5578,528 @@
 </p:sld>
 </file>
 
+<file path=ppt/slides/slide6.xml><?xml version="1.0" encoding="utf-8"?>
+<p:sld xmlns:a="http://schemas.openxmlformats.org/drawingml/2006/main" xmlns:r="http://schemas.openxmlformats.org/officeDocument/2006/relationships" xmlns:p="http://schemas.openxmlformats.org/presentationml/2006/main">
+  <p:cSld>
+    <p:spTree>
+      <p:nvGrpSpPr>
+        <p:cNvPr id="1" name=""/>
+        <p:cNvGrpSpPr/>
+        <p:nvPr/>
+      </p:nvGrpSpPr>
+      <p:grpSpPr>
+        <a:xfrm>
+          <a:off x="0" y="0"/>
+          <a:ext cx="0" cy="0"/>
+          <a:chOff x="0" y="0"/>
+          <a:chExt cx="0" cy="0"/>
+        </a:xfrm>
+      </p:grpSpPr>
+      <p:sp>
+        <p:nvSpPr>
+          <p:cNvPr id="8" name="Ellipse 7">
+            <a:extLst>
+              <a:ext uri="{FF2B5EF4-FFF2-40B4-BE49-F238E27FC236}">
+                <a16:creationId xmlns:a16="http://schemas.microsoft.com/office/drawing/2014/main" id="{D4C5D105-D3AA-9ABC-61B7-B3750CC84CC8}"/>
+              </a:ext>
+            </a:extLst>
+          </p:cNvPr>
+          <p:cNvSpPr/>
+          <p:nvPr/>
+        </p:nvSpPr>
+        <p:spPr>
+          <a:xfrm>
+            <a:off x="4539068" y="1717680"/>
+            <a:ext cx="3600000" cy="3600000"/>
+          </a:xfrm>
+          <a:prstGeom prst="ellipse">
+            <a:avLst/>
+          </a:prstGeom>
+          <a:noFill/>
+          <a:ln w="250825">
+            <a:solidFill>
+              <a:schemeClr val="tx1"/>
+            </a:solidFill>
+          </a:ln>
+        </p:spPr>
+        <p:style>
+          <a:lnRef idx="2">
+            <a:schemeClr val="accent1">
+              <a:shade val="15000"/>
+            </a:schemeClr>
+          </a:lnRef>
+          <a:fillRef idx="1">
+            <a:schemeClr val="accent1"/>
+          </a:fillRef>
+          <a:effectRef idx="0">
+            <a:schemeClr val="accent1"/>
+          </a:effectRef>
+          <a:fontRef idx="minor">
+            <a:schemeClr val="lt1"/>
+          </a:fontRef>
+        </p:style>
+        <p:txBody>
+          <a:bodyPr rtlCol="0" anchor="ctr"/>
+          <a:lstStyle/>
+          <a:p>
+            <a:pPr algn="ctr"/>
+            <a:endParaRPr lang="de-DE" dirty="0"/>
+          </a:p>
+        </p:txBody>
+      </p:sp>
+      <p:sp>
+        <p:nvSpPr>
+          <p:cNvPr id="11" name="Ellipse 10">
+            <a:extLst>
+              <a:ext uri="{FF2B5EF4-FFF2-40B4-BE49-F238E27FC236}">
+                <a16:creationId xmlns:a16="http://schemas.microsoft.com/office/drawing/2014/main" id="{D6CAFD23-EF53-9F68-8BDC-EB674C390BCD}"/>
+              </a:ext>
+            </a:extLst>
+          </p:cNvPr>
+          <p:cNvSpPr/>
+          <p:nvPr/>
+        </p:nvSpPr>
+        <p:spPr>
+          <a:xfrm>
+            <a:off x="10353623" y="2774156"/>
+            <a:ext cx="2328863" cy="1309688"/>
+          </a:xfrm>
+          <a:prstGeom prst="ellipse">
+            <a:avLst/>
+          </a:prstGeom>
+          <a:solidFill>
+            <a:schemeClr val="bg1"/>
+          </a:solidFill>
+          <a:ln>
+            <a:solidFill>
+              <a:schemeClr val="bg1"/>
+            </a:solidFill>
+          </a:ln>
+        </p:spPr>
+        <p:style>
+          <a:lnRef idx="2">
+            <a:schemeClr val="accent1">
+              <a:shade val="15000"/>
+            </a:schemeClr>
+          </a:lnRef>
+          <a:fillRef idx="1">
+            <a:schemeClr val="accent1"/>
+          </a:fillRef>
+          <a:effectRef idx="0">
+            <a:schemeClr val="accent1"/>
+          </a:effectRef>
+          <a:fontRef idx="minor">
+            <a:schemeClr val="lt1"/>
+          </a:fontRef>
+        </p:style>
+        <p:txBody>
+          <a:bodyPr rtlCol="0" anchor="ctr"/>
+          <a:lstStyle/>
+          <a:p>
+            <a:pPr algn="ctr"/>
+            <a:endParaRPr lang="de-DE"/>
+          </a:p>
+        </p:txBody>
+      </p:sp>
+      <p:cxnSp>
+        <p:nvCxnSpPr>
+          <p:cNvPr id="10" name="Gerade Verbindung mit Pfeil 9">
+            <a:extLst>
+              <a:ext uri="{FF2B5EF4-FFF2-40B4-BE49-F238E27FC236}">
+                <a16:creationId xmlns:a16="http://schemas.microsoft.com/office/drawing/2014/main" id="{D5696476-0C94-169E-6485-2DEAAB871826}"/>
+              </a:ext>
+            </a:extLst>
+          </p:cNvPr>
+          <p:cNvCxnSpPr>
+            <a:cxnSpLocks/>
+          </p:cNvCxnSpPr>
+          <p:nvPr/>
+        </p:nvCxnSpPr>
+        <p:spPr>
+          <a:xfrm>
+            <a:off x="7918055" y="2661028"/>
+            <a:ext cx="372269" cy="680183"/>
+          </a:xfrm>
+          <a:prstGeom prst="straightConnector1">
+            <a:avLst/>
+          </a:prstGeom>
+          <a:ln w="250825" cap="sq" cmpd="sng" algn="ctr">
+            <a:solidFill>
+              <a:schemeClr val="dk1"/>
+            </a:solidFill>
+            <a:prstDash val="solid"/>
+            <a:miter lim="800000"/>
+            <a:headEnd type="none" w="med" len="med"/>
+            <a:tailEnd type="triangle" w="med" len="med"/>
+          </a:ln>
+        </p:spPr>
+        <p:style>
+          <a:lnRef idx="0">
+            <a:scrgbClr r="0" g="0" b="0"/>
+          </a:lnRef>
+          <a:fillRef idx="0">
+            <a:scrgbClr r="0" g="0" b="0"/>
+          </a:fillRef>
+          <a:effectRef idx="0">
+            <a:scrgbClr r="0" g="0" b="0"/>
+          </a:effectRef>
+          <a:fontRef idx="minor">
+            <a:schemeClr val="tx1"/>
+          </a:fontRef>
+        </p:style>
+      </p:cxnSp>
+      <p:sp>
+        <p:nvSpPr>
+          <p:cNvPr id="34" name="Gleichschenkliges Dreieck 33">
+            <a:extLst>
+              <a:ext uri="{FF2B5EF4-FFF2-40B4-BE49-F238E27FC236}">
+                <a16:creationId xmlns:a16="http://schemas.microsoft.com/office/drawing/2014/main" id="{BE92AD19-B3FD-A391-A6A0-D87DE4BC6F8C}"/>
+              </a:ext>
+            </a:extLst>
+          </p:cNvPr>
+          <p:cNvSpPr/>
+          <p:nvPr/>
+        </p:nvSpPr>
+        <p:spPr>
+          <a:xfrm rot="5400000">
+            <a:off x="5766566" y="2862836"/>
+            <a:ext cx="1552575" cy="1309688"/>
+          </a:xfrm>
+          <a:prstGeom prst="triangle">
+            <a:avLst/>
+          </a:prstGeom>
+          <a:noFill/>
+          <a:ln w="244475">
+            <a:solidFill>
+              <a:schemeClr val="tx1"/>
+            </a:solidFill>
+          </a:ln>
+        </p:spPr>
+        <p:style>
+          <a:lnRef idx="2">
+            <a:schemeClr val="accent1">
+              <a:shade val="15000"/>
+            </a:schemeClr>
+          </a:lnRef>
+          <a:fillRef idx="1">
+            <a:schemeClr val="accent1"/>
+          </a:fillRef>
+          <a:effectRef idx="0">
+            <a:schemeClr val="accent1"/>
+          </a:effectRef>
+          <a:fontRef idx="minor">
+            <a:schemeClr val="lt1"/>
+          </a:fontRef>
+        </p:style>
+        <p:txBody>
+          <a:bodyPr rtlCol="0" anchor="ctr"/>
+          <a:lstStyle/>
+          <a:p>
+            <a:pPr algn="ctr"/>
+            <a:endParaRPr lang="de-DE" dirty="0"/>
+          </a:p>
+        </p:txBody>
+      </p:sp>
+    </p:spTree>
+    <p:extLst>
+      <p:ext uri="{BB962C8B-B14F-4D97-AF65-F5344CB8AC3E}">
+        <p14:creationId xmlns:p14="http://schemas.microsoft.com/office/powerpoint/2010/main" val="1010343257"/>
+      </p:ext>
+    </p:extLst>
+  </p:cSld>
+  <p:clrMapOvr>
+    <a:masterClrMapping/>
+  </p:clrMapOvr>
+</p:sld>
+</file>
+
+<file path=ppt/slides/slide7.xml><?xml version="1.0" encoding="utf-8"?>
+<p:sld xmlns:a="http://schemas.openxmlformats.org/drawingml/2006/main" xmlns:r="http://schemas.openxmlformats.org/officeDocument/2006/relationships" xmlns:p="http://schemas.openxmlformats.org/presentationml/2006/main">
+  <p:cSld>
+    <p:spTree>
+      <p:nvGrpSpPr>
+        <p:cNvPr id="1" name=""/>
+        <p:cNvGrpSpPr/>
+        <p:nvPr/>
+      </p:nvGrpSpPr>
+      <p:grpSpPr>
+        <a:xfrm>
+          <a:off x="0" y="0"/>
+          <a:ext cx="0" cy="0"/>
+          <a:chOff x="0" y="0"/>
+          <a:chExt cx="0" cy="0"/>
+        </a:xfrm>
+      </p:grpSpPr>
+      <p:sp>
+        <p:nvSpPr>
+          <p:cNvPr id="8" name="Ellipse 7">
+            <a:extLst>
+              <a:ext uri="{FF2B5EF4-FFF2-40B4-BE49-F238E27FC236}">
+                <a16:creationId xmlns:a16="http://schemas.microsoft.com/office/drawing/2014/main" id="{D4C5D105-D3AA-9ABC-61B7-B3750CC84CC8}"/>
+              </a:ext>
+            </a:extLst>
+          </p:cNvPr>
+          <p:cNvSpPr/>
+          <p:nvPr/>
+        </p:nvSpPr>
+        <p:spPr>
+          <a:xfrm>
+            <a:off x="4296000" y="1629000"/>
+            <a:ext cx="3600000" cy="3600000"/>
+          </a:xfrm>
+          <a:prstGeom prst="ellipse">
+            <a:avLst/>
+          </a:prstGeom>
+          <a:noFill/>
+          <a:ln w="250825">
+            <a:solidFill>
+              <a:schemeClr val="tx1"/>
+            </a:solidFill>
+          </a:ln>
+        </p:spPr>
+        <p:style>
+          <a:lnRef idx="2">
+            <a:schemeClr val="accent1">
+              <a:shade val="15000"/>
+            </a:schemeClr>
+          </a:lnRef>
+          <a:fillRef idx="1">
+            <a:schemeClr val="accent1"/>
+          </a:fillRef>
+          <a:effectRef idx="0">
+            <a:schemeClr val="accent1"/>
+          </a:effectRef>
+          <a:fontRef idx="minor">
+            <a:schemeClr val="lt1"/>
+          </a:fontRef>
+        </p:style>
+        <p:txBody>
+          <a:bodyPr rtlCol="0" anchor="ctr"/>
+          <a:lstStyle/>
+          <a:p>
+            <a:pPr algn="ctr"/>
+            <a:endParaRPr lang="de-DE" dirty="0"/>
+          </a:p>
+        </p:txBody>
+      </p:sp>
+      <p:sp>
+        <p:nvSpPr>
+          <p:cNvPr id="11" name="Ellipse 10">
+            <a:extLst>
+              <a:ext uri="{FF2B5EF4-FFF2-40B4-BE49-F238E27FC236}">
+                <a16:creationId xmlns:a16="http://schemas.microsoft.com/office/drawing/2014/main" id="{D6CAFD23-EF53-9F68-8BDC-EB674C390BCD}"/>
+              </a:ext>
+            </a:extLst>
+          </p:cNvPr>
+          <p:cNvSpPr/>
+          <p:nvPr/>
+        </p:nvSpPr>
+        <p:spPr>
+          <a:xfrm>
+            <a:off x="8728165" y="2886191"/>
+            <a:ext cx="2328863" cy="1309688"/>
+          </a:xfrm>
+          <a:prstGeom prst="ellipse">
+            <a:avLst/>
+          </a:prstGeom>
+          <a:solidFill>
+            <a:schemeClr val="bg1"/>
+          </a:solidFill>
+          <a:ln>
+            <a:solidFill>
+              <a:schemeClr val="bg1"/>
+            </a:solidFill>
+          </a:ln>
+        </p:spPr>
+        <p:style>
+          <a:lnRef idx="2">
+            <a:schemeClr val="accent1">
+              <a:shade val="15000"/>
+            </a:schemeClr>
+          </a:lnRef>
+          <a:fillRef idx="1">
+            <a:schemeClr val="accent1"/>
+          </a:fillRef>
+          <a:effectRef idx="0">
+            <a:schemeClr val="accent1"/>
+          </a:effectRef>
+          <a:fontRef idx="minor">
+            <a:schemeClr val="lt1"/>
+          </a:fontRef>
+        </p:style>
+        <p:txBody>
+          <a:bodyPr rtlCol="0" anchor="ctr"/>
+          <a:lstStyle/>
+          <a:p>
+            <a:pPr algn="ctr"/>
+            <a:endParaRPr lang="de-DE" dirty="0"/>
+          </a:p>
+        </p:txBody>
+      </p:sp>
+      <p:cxnSp>
+        <p:nvCxnSpPr>
+          <p:cNvPr id="10" name="Gerade Verbindung mit Pfeil 9">
+            <a:extLst>
+              <a:ext uri="{FF2B5EF4-FFF2-40B4-BE49-F238E27FC236}">
+                <a16:creationId xmlns:a16="http://schemas.microsoft.com/office/drawing/2014/main" id="{D5696476-0C94-169E-6485-2DEAAB871826}"/>
+              </a:ext>
+            </a:extLst>
+          </p:cNvPr>
+          <p:cNvCxnSpPr>
+            <a:cxnSpLocks/>
+          </p:cNvCxnSpPr>
+          <p:nvPr/>
+        </p:nvCxnSpPr>
+        <p:spPr>
+          <a:xfrm>
+            <a:off x="7674987" y="2572348"/>
+            <a:ext cx="372269" cy="680183"/>
+          </a:xfrm>
+          <a:prstGeom prst="straightConnector1">
+            <a:avLst/>
+          </a:prstGeom>
+          <a:ln w="250825" cap="sq" cmpd="sng" algn="ctr">
+            <a:solidFill>
+              <a:schemeClr val="dk1"/>
+            </a:solidFill>
+            <a:prstDash val="solid"/>
+            <a:miter lim="800000"/>
+            <a:headEnd type="none" w="med" len="med"/>
+            <a:tailEnd type="triangle" w="med" len="med"/>
+          </a:ln>
+        </p:spPr>
+        <p:style>
+          <a:lnRef idx="0">
+            <a:scrgbClr r="0" g="0" b="0"/>
+          </a:lnRef>
+          <a:fillRef idx="0">
+            <a:scrgbClr r="0" g="0" b="0"/>
+          </a:fillRef>
+          <a:effectRef idx="0">
+            <a:scrgbClr r="0" g="0" b="0"/>
+          </a:effectRef>
+          <a:fontRef idx="minor">
+            <a:schemeClr val="tx1"/>
+          </a:fontRef>
+        </p:style>
+      </p:cxnSp>
+      <p:sp>
+        <p:nvSpPr>
+          <p:cNvPr id="2" name="Rechteck 1">
+            <a:extLst>
+              <a:ext uri="{FF2B5EF4-FFF2-40B4-BE49-F238E27FC236}">
+                <a16:creationId xmlns:a16="http://schemas.microsoft.com/office/drawing/2014/main" id="{00E7F219-1317-EAD3-44B0-922A8AB8D16E}"/>
+              </a:ext>
+            </a:extLst>
+          </p:cNvPr>
+          <p:cNvSpPr/>
+          <p:nvPr/>
+        </p:nvSpPr>
+        <p:spPr>
+          <a:xfrm>
+            <a:off x="5574393" y="2685476"/>
+            <a:ext cx="288000" cy="1548000"/>
+          </a:xfrm>
+          <a:prstGeom prst="rect">
+            <a:avLst/>
+          </a:prstGeom>
+          <a:solidFill>
+            <a:schemeClr val="tx1"/>
+          </a:solidFill>
+          <a:ln>
+            <a:noFill/>
+          </a:ln>
+        </p:spPr>
+        <p:style>
+          <a:lnRef idx="2">
+            <a:schemeClr val="accent1">
+              <a:shade val="15000"/>
+            </a:schemeClr>
+          </a:lnRef>
+          <a:fillRef idx="1">
+            <a:schemeClr val="accent1"/>
+          </a:fillRef>
+          <a:effectRef idx="0">
+            <a:schemeClr val="accent1"/>
+          </a:effectRef>
+          <a:fontRef idx="minor">
+            <a:schemeClr val="lt1"/>
+          </a:fontRef>
+        </p:style>
+        <p:txBody>
+          <a:bodyPr rtlCol="0" anchor="ctr"/>
+          <a:lstStyle/>
+          <a:p>
+            <a:pPr algn="ctr"/>
+            <a:endParaRPr lang="de-DE"/>
+          </a:p>
+        </p:txBody>
+      </p:sp>
+      <p:sp>
+        <p:nvSpPr>
+          <p:cNvPr id="4" name="Rechteck 3">
+            <a:extLst>
+              <a:ext uri="{FF2B5EF4-FFF2-40B4-BE49-F238E27FC236}">
+                <a16:creationId xmlns:a16="http://schemas.microsoft.com/office/drawing/2014/main" id="{9E967D4A-6D94-2B9F-9612-7185C9175F09}"/>
+              </a:ext>
+            </a:extLst>
+          </p:cNvPr>
+          <p:cNvSpPr/>
+          <p:nvPr/>
+        </p:nvSpPr>
+        <p:spPr>
+          <a:xfrm>
+            <a:off x="6225610" y="2685476"/>
+            <a:ext cx="288000" cy="1548000"/>
+          </a:xfrm>
+          <a:prstGeom prst="rect">
+            <a:avLst/>
+          </a:prstGeom>
+          <a:solidFill>
+            <a:schemeClr val="tx1"/>
+          </a:solidFill>
+          <a:ln>
+            <a:noFill/>
+          </a:ln>
+        </p:spPr>
+        <p:style>
+          <a:lnRef idx="2">
+            <a:schemeClr val="accent1">
+              <a:shade val="15000"/>
+            </a:schemeClr>
+          </a:lnRef>
+          <a:fillRef idx="1">
+            <a:schemeClr val="accent1"/>
+          </a:fillRef>
+          <a:effectRef idx="0">
+            <a:schemeClr val="accent1"/>
+          </a:effectRef>
+          <a:fontRef idx="minor">
+            <a:schemeClr val="lt1"/>
+          </a:fontRef>
+        </p:style>
+        <p:txBody>
+          <a:bodyPr rtlCol="0" anchor="ctr"/>
+          <a:lstStyle/>
+          <a:p>
+            <a:pPr algn="ctr"/>
+            <a:endParaRPr lang="de-DE"/>
+          </a:p>
+        </p:txBody>
+      </p:sp>
+    </p:spTree>
+    <p:extLst>
+      <p:ext uri="{BB962C8B-B14F-4D97-AF65-F5344CB8AC3E}">
+        <p14:creationId xmlns:p14="http://schemas.microsoft.com/office/powerpoint/2010/main" val="2993668986"/>
+      </p:ext>
+    </p:extLst>
+  </p:cSld>
+  <p:clrMapOvr>
+    <a:masterClrMapping/>
+  </p:clrMapOvr>
+</p:sld>
+</file>
+
 <file path=ppt/theme/theme1.xml><?xml version="1.0" encoding="utf-8"?>
 <a:theme xmlns:a="http://schemas.openxmlformats.org/drawingml/2006/main" name="Office">
   <a:themeElements>

</xml_diff>